<commit_message>
Made changes and enhancements to the preliminary draft
</commit_message>
<xml_diff>
--- a/DocSources/images/installation-br.pptx
+++ b/DocSources/images/installation-br.pptx
@@ -12513,9 +12513,9 @@
         <p:grpSpPr>
           <a:xfrm>
             <a:off x="2555777" y="3140968"/>
-            <a:ext cx="4176462" cy="2088232"/>
+            <a:ext cx="4176462" cy="1728192"/>
             <a:chOff x="2555777" y="3140968"/>
-            <a:chExt cx="4176462" cy="2088232"/>
+            <a:chExt cx="4176462" cy="1728192"/>
           </a:xfrm>
         </p:grpSpPr>
         <p:sp>
@@ -12527,7 +12527,7 @@
           <p:spPr bwMode="auto">
             <a:xfrm>
               <a:off x="5076056" y="3140968"/>
-              <a:ext cx="1656183" cy="2088232"/>
+              <a:ext cx="1656183" cy="1728192"/>
             </a:xfrm>
             <a:prstGeom prst="rect">
               <a:avLst/>
@@ -12630,9 +12630,9 @@
           <p:grpSpPr>
             <a:xfrm>
               <a:off x="2576340" y="3140968"/>
-              <a:ext cx="3867868" cy="2088232"/>
+              <a:ext cx="4055373" cy="1728192"/>
               <a:chOff x="2555775" y="3119482"/>
-              <a:chExt cx="3767126" cy="2088232"/>
+              <a:chExt cx="3949747" cy="1728192"/>
             </a:xfrm>
           </p:grpSpPr>
           <p:sp>
@@ -12644,7 +12644,7 @@
             <p:spPr bwMode="auto">
               <a:xfrm>
                 <a:off x="2555775" y="3119482"/>
-                <a:ext cx="1656183" cy="2088232"/>
+                <a:ext cx="1656183" cy="1728192"/>
               </a:xfrm>
               <a:prstGeom prst="rect">
                 <a:avLst/>
@@ -12774,14 +12774,14 @@
           </p:sp>
           <p:sp>
             <p:nvSpPr>
-              <p:cNvPr id="15" name="Rectangle 14"/>
+              <p:cNvPr id="16" name="Rectangle 15"/>
               <p:cNvSpPr/>
               <p:nvPr/>
             </p:nvSpPr>
             <p:spPr bwMode="auto">
               <a:xfrm>
-                <a:off x="5270913" y="3614642"/>
-                <a:ext cx="720080" cy="224920"/>
+                <a:off x="5200781" y="3614642"/>
+                <a:ext cx="1304741" cy="224920"/>
               </a:xfrm>
               <a:prstGeom prst="rect">
                 <a:avLst/>
@@ -12849,90 +12849,19 @@
                     <a:latin typeface="Fujitsu Sans" panose="020B0404060202020204" pitchFamily="34" charset="0"/>
                     <a:ea typeface="ＭＳ Ｐゴシック" pitchFamily="50" charset="-128"/>
                   </a:rPr>
-                  <a:t>Keystone</a:t>
+                  <a:t>Horizon Service</a:t>
                 </a:r>
-              </a:p>
-            </p:txBody>
-          </p:sp>
-          <p:sp>
-            <p:nvSpPr>
-              <p:cNvPr id="16" name="Rectangle 15"/>
-              <p:cNvSpPr/>
-              <p:nvPr/>
-            </p:nvSpPr>
-            <p:spPr bwMode="auto">
-              <a:xfrm>
-                <a:off x="5270913" y="3911570"/>
-                <a:ext cx="720080" cy="224920"/>
-              </a:xfrm>
-              <a:prstGeom prst="rect">
-                <a:avLst/>
-              </a:prstGeom>
-              <a:solidFill>
-                <a:srgbClr val="FDF1F1"/>
-              </a:solidFill>
-              <a:ln w="9525">
-                <a:solidFill>
-                  <a:schemeClr val="bg1"/>
-                </a:solidFill>
-                <a:headEnd type="none" w="med" len="med"/>
-                <a:tailEnd type="none" w="med" len="med"/>
-              </a:ln>
-            </p:spPr>
-            <p:style>
-              <a:lnRef idx="2">
-                <a:schemeClr val="accent2">
-                  <a:shade val="50000"/>
-                </a:schemeClr>
-              </a:lnRef>
-              <a:fillRef idx="1">
-                <a:schemeClr val="accent2"/>
-              </a:fillRef>
-              <a:effectRef idx="0">
-                <a:schemeClr val="accent2"/>
-              </a:effectRef>
-              <a:fontRef idx="minor">
-                <a:schemeClr val="lt1"/>
-              </a:fontRef>
-            </p:style>
-            <p:txBody>
-              <a:bodyPr vert="horz" wrap="none" lIns="91440" tIns="45720" rIns="91440" bIns="45720" numCol="1" rtlCol="0" anchor="ctr" anchorCtr="0" compatLnSpc="1">
-                <a:prstTxWarp prst="textNoShape">
-                  <a:avLst/>
-                </a:prstTxWarp>
-              </a:bodyPr>
-              <a:lstStyle/>
-              <a:p>
-                <a:pPr marL="0" marR="0" indent="0" algn="l" defTabSz="914400" rtl="0" eaLnBrk="1" fontAlgn="ctr" latinLnBrk="0" hangingPunct="1">
-                  <a:lnSpc>
-                    <a:spcPct val="100000"/>
-                  </a:lnSpc>
-                  <a:spcBef>
-                    <a:spcPct val="0"/>
-                  </a:spcBef>
-                  <a:spcAft>
-                    <a:spcPct val="0"/>
-                  </a:spcAft>
-                  <a:buClrTx/>
-                  <a:buSzTx/>
-                  <a:buFontTx/>
-                  <a:buNone/>
-                  <a:tabLst/>
-                </a:pPr>
-                <a:r>
-                  <a:rPr kumimoji="1" lang="en-US" sz="1600" b="0" i="0" u="none" strike="noStrike" cap="none" normalizeH="0" baseline="0" dirty="0" smtClean="0">
-                    <a:ln>
-                      <a:noFill/>
-                    </a:ln>
-                    <a:solidFill>
-                      <a:schemeClr val="tx1"/>
-                    </a:solidFill>
-                    <a:effectLst/>
-                    <a:latin typeface="Fujitsu Sans" panose="020B0404060202020204" pitchFamily="34" charset="0"/>
-                    <a:ea typeface="ＭＳ Ｐゴシック" pitchFamily="50" charset="-128"/>
-                  </a:rPr>
-                  <a:t>Horizon</a:t>
-                </a:r>
+                <a:endParaRPr kumimoji="1" lang="en-US" sz="1600" b="0" i="0" u="none" strike="noStrike" cap="none" normalizeH="0" baseline="0" dirty="0" smtClean="0">
+                  <a:ln>
+                    <a:noFill/>
+                  </a:ln>
+                  <a:solidFill>
+                    <a:schemeClr val="tx1"/>
+                  </a:solidFill>
+                  <a:effectLst/>
+                  <a:latin typeface="Fujitsu Sans" panose="020B0404060202020204" pitchFamily="34" charset="0"/>
+                  <a:ea typeface="ＭＳ Ｐゴシック" pitchFamily="50" charset="-128"/>
+                </a:endParaRPr>
               </a:p>
             </p:txBody>
           </p:sp>
@@ -13212,7 +13141,7 @@
           </p:nvSpPr>
           <p:spPr bwMode="auto">
             <a:xfrm>
-              <a:off x="5292080" y="4293096"/>
+              <a:off x="5292080" y="3933056"/>
               <a:ext cx="1339634" cy="238056"/>
             </a:xfrm>
             <a:prstGeom prst="rect">
@@ -13291,7 +13220,7 @@
           </p:nvSpPr>
           <p:spPr bwMode="auto">
             <a:xfrm>
-              <a:off x="5292079" y="4581128"/>
+              <a:off x="5292079" y="4221088"/>
               <a:ext cx="1339635" cy="238056"/>
             </a:xfrm>
             <a:prstGeom prst="rect">
@@ -13370,7 +13299,7 @@
           </p:nvSpPr>
           <p:spPr bwMode="auto">
             <a:xfrm>
-              <a:off x="5292079" y="4860264"/>
+              <a:off x="5292079" y="4509120"/>
               <a:ext cx="1339634" cy="224920"/>
             </a:xfrm>
             <a:prstGeom prst="rect">

</xml_diff>